<commit_message>
add 04ppt and rdc
</commit_message>
<xml_diff>
--- a/PPTs/04.引擎基础概念与底层实用系统.pptx
+++ b/PPTs/04.引擎基础概念与底层实用系统.pptx
@@ -13560,7 +13560,7 @@
         <p:spPr>
           <a:xfrm>
             <a:off x="2426714" y="3954552"/>
-            <a:ext cx="8303490" cy="14044870"/>
+            <a:ext cx="8303490" cy="12490599"/>
           </a:xfrm>
           <a:prstGeom prst="rect">
             <a:avLst/>
@@ -13742,18 +13742,7 @@
                 <a:ea typeface="微软雅黑 Light" panose="020B0502040204020203" pitchFamily="34" charset="-122"/>
                 <a:sym typeface="Helvetica Light"/>
               </a:rPr>
-              <a:t>，用</a:t>
-            </a:r>
-            <a:r>
-              <a:rPr lang="en-US" altLang="zh-CN" sz="3200" dirty="0" err="1" smtClean="0">
-                <a:solidFill>
-                  <a:srgbClr val="000000"/>
-                </a:solidFill>
-                <a:latin typeface="微软雅黑 Light" panose="020B0502040204020203" pitchFamily="34" charset="-122"/>
-                <a:ea typeface="微软雅黑 Light" panose="020B0502040204020203" pitchFamily="34" charset="-122"/>
-                <a:sym typeface="Helvetica Light"/>
-              </a:rPr>
-              <a:t>CommandList</a:t>
+              <a:t>，</a:t>
             </a:r>
             <a:r>
               <a:rPr lang="zh-CN" altLang="en-US" sz="3200" dirty="0" smtClean="0">
@@ -13764,51 +13753,7 @@
                 <a:ea typeface="微软雅黑 Light" panose="020B0502040204020203" pitchFamily="34" charset="-122"/>
                 <a:sym typeface="Helvetica Light"/>
               </a:rPr>
-              <a:t>为</a:t>
-            </a:r>
-            <a:r>
-              <a:rPr lang="en-US" altLang="zh-CN" sz="3200" dirty="0" smtClean="0">
-                <a:solidFill>
-                  <a:srgbClr val="000000"/>
-                </a:solidFill>
-                <a:latin typeface="微软雅黑 Light" panose="020B0502040204020203" pitchFamily="34" charset="-122"/>
-                <a:ea typeface="微软雅黑 Light" panose="020B0502040204020203" pitchFamily="34" charset="-122"/>
-                <a:sym typeface="Helvetica Light"/>
-              </a:rPr>
-              <a:t>Object</a:t>
-            </a:r>
-            <a:r>
-              <a:rPr lang="zh-CN" altLang="en-US" sz="3200" dirty="0" smtClean="0">
-                <a:solidFill>
-                  <a:srgbClr val="000000"/>
-                </a:solidFill>
-                <a:latin typeface="微软雅黑 Light" panose="020B0502040204020203" pitchFamily="34" charset="-122"/>
-                <a:ea typeface="微软雅黑 Light" panose="020B0502040204020203" pitchFamily="34" charset="-122"/>
-                <a:sym typeface="Helvetica Light"/>
-              </a:rPr>
-              <a:t>设置当前的</a:t>
-            </a:r>
-            <a:r>
-              <a:rPr lang="en-US" altLang="zh-CN" sz="3200" dirty="0" smtClean="0">
-                <a:solidFill>
-                  <a:srgbClr val="000000"/>
-                </a:solidFill>
-                <a:latin typeface="微软雅黑 Light" panose="020B0502040204020203" pitchFamily="34" charset="-122"/>
-                <a:ea typeface="微软雅黑 Light" panose="020B0502040204020203" pitchFamily="34" charset="-122"/>
-                <a:sym typeface="Helvetica Light"/>
-              </a:rPr>
-              <a:t>PSO</a:t>
-            </a:r>
-            <a:r>
-              <a:rPr lang="zh-CN" altLang="en-US" sz="3200" dirty="0" smtClean="0">
-                <a:solidFill>
-                  <a:srgbClr val="000000"/>
-                </a:solidFill>
-                <a:latin typeface="微软雅黑 Light" panose="020B0502040204020203" pitchFamily="34" charset="-122"/>
-                <a:ea typeface="微软雅黑 Light" panose="020B0502040204020203" pitchFamily="34" charset="-122"/>
-                <a:sym typeface="Helvetica Light"/>
-              </a:rPr>
-              <a:t>对象</a:t>
+              <a:t>指定所使用的材质和材质实例</a:t>
             </a:r>
             <a:endParaRPr lang="en-US" altLang="zh-CN" sz="3200" dirty="0" smtClean="0">
               <a:solidFill>
@@ -13842,15 +13787,15 @@
               <a:t>设置</a:t>
             </a:r>
             <a:r>
-              <a:rPr lang="en-US" altLang="zh-CN" sz="3200" b="0" dirty="0" smtClean="0">
-                <a:solidFill>
-                  <a:srgbClr val="000000"/>
-                </a:solidFill>
-                <a:latin typeface="微软雅黑 Light" panose="020B0502040204020203" pitchFamily="34" charset="-122"/>
-                <a:ea typeface="微软雅黑 Light" panose="020B0502040204020203" pitchFamily="34" charset="-122"/>
-                <a:sym typeface="Helvetica Light"/>
-              </a:rPr>
-              <a:t>Object</a:t>
+              <a:rPr lang="en-US" altLang="zh-CN" sz="3200" b="0" dirty="0" err="1" smtClean="0">
+                <a:solidFill>
+                  <a:srgbClr val="000000"/>
+                </a:solidFill>
+                <a:latin typeface="微软雅黑 Light" panose="020B0502040204020203" pitchFamily="34" charset="-122"/>
+                <a:ea typeface="微软雅黑 Light" panose="020B0502040204020203" pitchFamily="34" charset="-122"/>
+                <a:sym typeface="Helvetica Light"/>
+              </a:rPr>
+              <a:t>VertexBuffer</a:t>
             </a:r>
             <a:r>
               <a:rPr lang="zh-CN" altLang="en-US" sz="3200" b="0" dirty="0" smtClean="0">
@@ -13861,7 +13806,7 @@
                 <a:ea typeface="微软雅黑 Light" panose="020B0502040204020203" pitchFamily="34" charset="-122"/>
                 <a:sym typeface="Helvetica Light"/>
               </a:rPr>
-              <a:t>的</a:t>
+              <a:t>和</a:t>
             </a:r>
             <a:r>
               <a:rPr lang="en-US" altLang="zh-CN" sz="3200" b="0" dirty="0" err="1" smtClean="0">
@@ -13872,29 +13817,7 @@
                 <a:ea typeface="微软雅黑 Light" panose="020B0502040204020203" pitchFamily="34" charset="-122"/>
                 <a:sym typeface="Helvetica Light"/>
               </a:rPr>
-              <a:t>VertexBufferView</a:t>
-            </a:r>
-            <a:r>
-              <a:rPr lang="zh-CN" altLang="en-US" sz="3200" b="0" dirty="0" smtClean="0">
-                <a:solidFill>
-                  <a:srgbClr val="000000"/>
-                </a:solidFill>
-                <a:latin typeface="微软雅黑 Light" panose="020B0502040204020203" pitchFamily="34" charset="-122"/>
-                <a:ea typeface="微软雅黑 Light" panose="020B0502040204020203" pitchFamily="34" charset="-122"/>
-                <a:sym typeface="Helvetica Light"/>
-              </a:rPr>
-              <a:t>和</a:t>
-            </a:r>
-            <a:r>
-              <a:rPr lang="en-US" altLang="zh-CN" sz="3200" b="0" dirty="0" err="1" smtClean="0">
-                <a:solidFill>
-                  <a:srgbClr val="000000"/>
-                </a:solidFill>
-                <a:latin typeface="微软雅黑 Light" panose="020B0502040204020203" pitchFamily="34" charset="-122"/>
-                <a:ea typeface="微软雅黑 Light" panose="020B0502040204020203" pitchFamily="34" charset="-122"/>
-                <a:sym typeface="Helvetica Light"/>
-              </a:rPr>
-              <a:t>IndexBufferView</a:t>
+              <a:t>IndexBuffer</a:t>
             </a:r>
             <a:endParaRPr lang="en-US" altLang="zh-CN" sz="3200" b="0" dirty="0" smtClean="0">
               <a:solidFill>
@@ -14014,37 +13937,6 @@
                 <a:sym typeface="Helvetica Light"/>
               </a:rPr>
               <a:t>变换</a:t>
-            </a:r>
-            <a:endParaRPr lang="en-US" altLang="zh-CN" sz="3200" dirty="0" smtClean="0">
-              <a:solidFill>
-                <a:srgbClr val="000000"/>
-              </a:solidFill>
-              <a:latin typeface="微软雅黑 Light" panose="020B0502040204020203" pitchFamily="34" charset="-122"/>
-              <a:ea typeface="微软雅黑 Light" panose="020B0502040204020203" pitchFamily="34" charset="-122"/>
-              <a:sym typeface="Helvetica Light"/>
-            </a:endParaRPr>
-          </a:p>
-          <a:p>
-            <a:pPr marL="1657350" lvl="1" indent="-742950">
-              <a:lnSpc>
-                <a:spcPct val="150000"/>
-              </a:lnSpc>
-              <a:spcBef>
-                <a:spcPts val="600"/>
-              </a:spcBef>
-              <a:buFont typeface="+mj-lt"/>
-              <a:buAutoNum type="arabicPeriod"/>
-            </a:pPr>
-            <a:r>
-              <a:rPr lang="zh-CN" altLang="en-US" sz="3200" dirty="0" smtClean="0">
-                <a:solidFill>
-                  <a:srgbClr val="000000"/>
-                </a:solidFill>
-                <a:latin typeface="微软雅黑 Light" panose="020B0502040204020203" pitchFamily="34" charset="-122"/>
-                <a:ea typeface="微软雅黑 Light" panose="020B0502040204020203" pitchFamily="34" charset="-122"/>
-                <a:sym typeface="Helvetica Light"/>
-              </a:rPr>
-              <a:t>设置 贴图</a:t>
             </a:r>
             <a:endParaRPr lang="en-US" altLang="zh-CN" sz="3200" dirty="0" smtClean="0">
               <a:solidFill>
@@ -18141,18 +18033,7 @@
                 <a:ea typeface="微软雅黑 Light" panose="020B0502040204020203" pitchFamily="34" charset="-122"/>
                 <a:sym typeface="Helvetica Light"/>
               </a:rPr>
-              <a:t>：虚幻里的任务</a:t>
-            </a:r>
-            <a:r>
-              <a:rPr lang="zh-CN" altLang="en-US" b="0" dirty="0" smtClean="0">
-                <a:solidFill>
-                  <a:srgbClr val="000000"/>
-                </a:solidFill>
-                <a:latin typeface="微软雅黑 Light" panose="020B0502040204020203" pitchFamily="34" charset="-122"/>
-                <a:ea typeface="微软雅黑 Light" panose="020B0502040204020203" pitchFamily="34" charset="-122"/>
-                <a:sym typeface="Helvetica Light"/>
-              </a:rPr>
-              <a:t>系统</a:t>
+              <a:t>：虚幻里的任务系统</a:t>
             </a:r>
             <a:endParaRPr lang="en-US" altLang="zh-CN" b="0" dirty="0">
               <a:solidFill>
@@ -18612,18 +18493,7 @@
                 <a:ea typeface="微软雅黑 Light" panose="020B0502040204020203" pitchFamily="34" charset="-122"/>
                 <a:sym typeface="Helvetica Light"/>
               </a:rPr>
-              <a:t>渲染</a:t>
-            </a:r>
-            <a:r>
-              <a:rPr lang="zh-CN" altLang="en-US" b="0" dirty="0" smtClean="0">
-                <a:solidFill>
-                  <a:srgbClr val="000000"/>
-                </a:solidFill>
-                <a:latin typeface="微软雅黑 Light" panose="020B0502040204020203" pitchFamily="34" charset="-122"/>
-                <a:ea typeface="微软雅黑 Light" panose="020B0502040204020203" pitchFamily="34" charset="-122"/>
-                <a:sym typeface="Helvetica Light"/>
-              </a:rPr>
-              <a:t>线程</a:t>
+              <a:t>渲染线程</a:t>
             </a:r>
             <a:r>
               <a:rPr lang="zh-CN" altLang="en-US" b="0" dirty="0">
@@ -18759,7 +18629,7 @@
       </p:sp>
       <p:pic>
         <p:nvPicPr>
-          <p:cNvPr id="7" name="图片 6"/>
+          <p:cNvPr id="2" name="图片 1"/>
           <p:cNvPicPr>
             <a:picLocks noChangeAspect="1"/>
           </p:cNvPicPr>
@@ -18773,8 +18643,8 @@
         </p:blipFill>
         <p:spPr>
           <a:xfrm>
-            <a:off x="12055152" y="3721358"/>
-            <a:ext cx="12392271" cy="4321629"/>
+            <a:off x="12965723" y="1684029"/>
+            <a:ext cx="10366938" cy="10519617"/>
           </a:xfrm>
           <a:prstGeom prst="rect">
             <a:avLst/>
@@ -24410,7 +24280,7 @@
         <p:spPr>
           <a:xfrm>
             <a:off x="2423160" y="3959352"/>
-            <a:ext cx="9720072" cy="8017516"/>
+            <a:ext cx="9720072" cy="9028113"/>
           </a:xfrm>
           <a:prstGeom prst="rect">
             <a:avLst/>
@@ -24453,19 +24323,27 @@
                 <a:ea typeface="微软雅黑 Light" panose="020B0502040204020203" pitchFamily="34" charset="-122"/>
                 <a:sym typeface="Helvetica Light"/>
               </a:rPr>
-              <a:t>创建游戏实例，初始化引擎</a:t>
-            </a:r>
-            <a:r>
-              <a:rPr lang="en-US" altLang="zh-CN" b="0" dirty="0">
-                <a:solidFill>
-                  <a:srgbClr val="000000"/>
-                </a:solidFill>
-                <a:latin typeface="微软雅黑 Light" panose="020B0502040204020203" pitchFamily="34" charset="-122"/>
-                <a:ea typeface="微软雅黑 Light" panose="020B0502040204020203" pitchFamily="34" charset="-122"/>
-                <a:sym typeface="Helvetica Light"/>
-              </a:rPr>
-              <a:t>….</a:t>
-            </a:r>
+              <a:t>创建游戏实例，</a:t>
+            </a:r>
+            <a:r>
+              <a:rPr lang="zh-CN" altLang="en-US" b="0" dirty="0" smtClean="0">
+                <a:solidFill>
+                  <a:srgbClr val="000000"/>
+                </a:solidFill>
+                <a:latin typeface="微软雅黑 Light" panose="020B0502040204020203" pitchFamily="34" charset="-122"/>
+                <a:ea typeface="微软雅黑 Light" panose="020B0502040204020203" pitchFamily="34" charset="-122"/>
+                <a:sym typeface="Helvetica Light"/>
+              </a:rPr>
+              <a:t>初始化引擎</a:t>
+            </a:r>
+            <a:endParaRPr lang="en-US" altLang="zh-CN" b="0" dirty="0">
+              <a:solidFill>
+                <a:srgbClr val="000000"/>
+              </a:solidFill>
+              <a:latin typeface="微软雅黑 Light" panose="020B0502040204020203" pitchFamily="34" charset="-122"/>
+              <a:ea typeface="微软雅黑 Light" panose="020B0502040204020203" pitchFamily="34" charset="-122"/>
+              <a:sym typeface="Helvetica Light"/>
+            </a:endParaRPr>
           </a:p>
           <a:p>
             <a:pPr marL="571500" indent="-571500">
@@ -24523,7 +24401,7 @@
               <a:t>, RHI</a:t>
             </a:r>
             <a:r>
-              <a:rPr lang="zh-CN" altLang="en-US" b="0" dirty="0">
+              <a:rPr lang="zh-CN" altLang="en-US" b="0" dirty="0" smtClean="0">
                 <a:solidFill>
                   <a:srgbClr val="000000"/>
                 </a:solidFill>
@@ -24533,17 +24411,14 @@
               </a:rPr>
               <a:t>初始化</a:t>
             </a:r>
-            <a:r>
-              <a:rPr lang="en-US" altLang="zh-CN" b="0" dirty="0">
-                <a:solidFill>
-                  <a:srgbClr val="000000"/>
-                </a:solidFill>
-                <a:latin typeface="微软雅黑 Light" panose="020B0502040204020203" pitchFamily="34" charset="-122"/>
-                <a:ea typeface="微软雅黑 Light" panose="020B0502040204020203" pitchFamily="34" charset="-122"/>
-                <a:sym typeface="Helvetica Light"/>
-              </a:rPr>
-              <a:t>..</a:t>
-            </a:r>
+            <a:endParaRPr lang="en-US" altLang="zh-CN" b="0" dirty="0">
+              <a:solidFill>
+                <a:srgbClr val="000000"/>
+              </a:solidFill>
+              <a:latin typeface="微软雅黑 Light" panose="020B0502040204020203" pitchFamily="34" charset="-122"/>
+              <a:ea typeface="微软雅黑 Light" panose="020B0502040204020203" pitchFamily="34" charset="-122"/>
+              <a:sym typeface="Helvetica Light"/>
+            </a:endParaRPr>
           </a:p>
           <a:p>
             <a:pPr marL="571500" indent="-571500">
@@ -24565,19 +24440,27 @@
                 <a:ea typeface="微软雅黑 Light" panose="020B0502040204020203" pitchFamily="34" charset="-122"/>
                 <a:sym typeface="Helvetica Light"/>
               </a:rPr>
-              <a:t>创建资源管理器，加载地图资源</a:t>
-            </a:r>
-            <a:r>
-              <a:rPr lang="en-US" altLang="zh-CN" b="0" dirty="0">
-                <a:solidFill>
-                  <a:srgbClr val="000000"/>
-                </a:solidFill>
-                <a:latin typeface="微软雅黑 Light" panose="020B0502040204020203" pitchFamily="34" charset="-122"/>
-                <a:ea typeface="微软雅黑 Light" panose="020B0502040204020203" pitchFamily="34" charset="-122"/>
-                <a:sym typeface="Helvetica Light"/>
-              </a:rPr>
-              <a:t>..</a:t>
-            </a:r>
+              <a:t>创建资源管理器，加载地图</a:t>
+            </a:r>
+            <a:r>
+              <a:rPr lang="zh-CN" altLang="en-US" b="0" dirty="0" smtClean="0">
+                <a:solidFill>
+                  <a:srgbClr val="000000"/>
+                </a:solidFill>
+                <a:latin typeface="微软雅黑 Light" panose="020B0502040204020203" pitchFamily="34" charset="-122"/>
+                <a:ea typeface="微软雅黑 Light" panose="020B0502040204020203" pitchFamily="34" charset="-122"/>
+                <a:sym typeface="Helvetica Light"/>
+              </a:rPr>
+              <a:t>资源</a:t>
+            </a:r>
+            <a:endParaRPr lang="en-US" altLang="zh-CN" b="0" dirty="0">
+              <a:solidFill>
+                <a:srgbClr val="000000"/>
+              </a:solidFill>
+              <a:latin typeface="微软雅黑 Light" panose="020B0502040204020203" pitchFamily="34" charset="-122"/>
+              <a:ea typeface="微软雅黑 Light" panose="020B0502040204020203" pitchFamily="34" charset="-122"/>
+              <a:sym typeface="Helvetica Light"/>
+            </a:endParaRPr>
           </a:p>
           <a:p>
             <a:pPr marL="571500" indent="-571500">
@@ -24599,19 +24482,27 @@
                 <a:ea typeface="微软雅黑 Light" panose="020B0502040204020203" pitchFamily="34" charset="-122"/>
                 <a:sym typeface="Helvetica Light"/>
               </a:rPr>
-              <a:t>创建当前场景，初始化摄像机</a:t>
-            </a:r>
-            <a:r>
-              <a:rPr lang="en-US" altLang="zh-CN" b="0" dirty="0">
-                <a:solidFill>
-                  <a:srgbClr val="000000"/>
-                </a:solidFill>
-                <a:latin typeface="微软雅黑 Light" panose="020B0502040204020203" pitchFamily="34" charset="-122"/>
-                <a:ea typeface="微软雅黑 Light" panose="020B0502040204020203" pitchFamily="34" charset="-122"/>
-                <a:sym typeface="Helvetica Light"/>
-              </a:rPr>
-              <a:t>..</a:t>
-            </a:r>
+              <a:t>创建当前场景，初始化</a:t>
+            </a:r>
+            <a:r>
+              <a:rPr lang="zh-CN" altLang="en-US" b="0" dirty="0" smtClean="0">
+                <a:solidFill>
+                  <a:srgbClr val="000000"/>
+                </a:solidFill>
+                <a:latin typeface="微软雅黑 Light" panose="020B0502040204020203" pitchFamily="34" charset="-122"/>
+                <a:ea typeface="微软雅黑 Light" panose="020B0502040204020203" pitchFamily="34" charset="-122"/>
+                <a:sym typeface="Helvetica Light"/>
+              </a:rPr>
+              <a:t>摄像机</a:t>
+            </a:r>
+            <a:endParaRPr lang="en-US" altLang="zh-CN" b="0" dirty="0">
+              <a:solidFill>
+                <a:srgbClr val="000000"/>
+              </a:solidFill>
+              <a:latin typeface="微软雅黑 Light" panose="020B0502040204020203" pitchFamily="34" charset="-122"/>
+              <a:ea typeface="微软雅黑 Light" panose="020B0502040204020203" pitchFamily="34" charset="-122"/>
+              <a:sym typeface="Helvetica Light"/>
+            </a:endParaRPr>
           </a:p>
           <a:p>
             <a:pPr marL="571500" indent="-571500">
@@ -24633,19 +24524,58 @@
                 <a:ea typeface="微软雅黑 Light" panose="020B0502040204020203" pitchFamily="34" charset="-122"/>
                 <a:sym typeface="Helvetica Light"/>
               </a:rPr>
-              <a:t>资源准备完毕，开启游戏循环</a:t>
-            </a:r>
-            <a:r>
-              <a:rPr lang="en-US" altLang="zh-CN" b="0" dirty="0">
-                <a:solidFill>
-                  <a:srgbClr val="000000"/>
-                </a:solidFill>
-                <a:latin typeface="微软雅黑 Light" panose="020B0502040204020203" pitchFamily="34" charset="-122"/>
-                <a:ea typeface="微软雅黑 Light" panose="020B0502040204020203" pitchFamily="34" charset="-122"/>
-                <a:sym typeface="Helvetica Light"/>
-              </a:rPr>
-              <a:t>..</a:t>
-            </a:r>
+              <a:t>资源准备完毕，开启游戏</a:t>
+            </a:r>
+            <a:r>
+              <a:rPr lang="zh-CN" altLang="en-US" b="0" dirty="0" smtClean="0">
+                <a:solidFill>
+                  <a:srgbClr val="000000"/>
+                </a:solidFill>
+                <a:latin typeface="微软雅黑 Light" panose="020B0502040204020203" pitchFamily="34" charset="-122"/>
+                <a:ea typeface="微软雅黑 Light" panose="020B0502040204020203" pitchFamily="34" charset="-122"/>
+                <a:sym typeface="Helvetica Light"/>
+              </a:rPr>
+              <a:t>循环</a:t>
+            </a:r>
+            <a:endParaRPr lang="en-US" altLang="zh-CN" b="0" dirty="0">
+              <a:solidFill>
+                <a:srgbClr val="000000"/>
+              </a:solidFill>
+              <a:latin typeface="微软雅黑 Light" panose="020B0502040204020203" pitchFamily="34" charset="-122"/>
+              <a:ea typeface="微软雅黑 Light" panose="020B0502040204020203" pitchFamily="34" charset="-122"/>
+              <a:sym typeface="Helvetica Light"/>
+            </a:endParaRPr>
+          </a:p>
+          <a:p>
+            <a:pPr marL="571500" indent="-571500">
+              <a:lnSpc>
+                <a:spcPct val="150000"/>
+              </a:lnSpc>
+              <a:spcBef>
+                <a:spcPts val="600"/>
+              </a:spcBef>
+              <a:buFont typeface="Arial" panose="020B0604020202020204" pitchFamily="34" charset="0"/>
+              <a:buChar char="•"/>
+            </a:pPr>
+            <a:r>
+              <a:rPr lang="en-US" altLang="zh-CN" b="0" dirty="0" smtClean="0">
+                <a:solidFill>
+                  <a:srgbClr val="000000"/>
+                </a:solidFill>
+                <a:latin typeface="微软雅黑 Light" panose="020B0502040204020203" pitchFamily="34" charset="-122"/>
+                <a:ea typeface="微软雅黑 Light" panose="020B0502040204020203" pitchFamily="34" charset="-122"/>
+                <a:sym typeface="Helvetica Light"/>
+              </a:rPr>
+              <a:t>…</a:t>
+            </a:r>
+            <a:endParaRPr lang="en-US" altLang="zh-CN" b="0" dirty="0">
+              <a:solidFill>
+                <a:srgbClr val="000000"/>
+              </a:solidFill>
+              <a:latin typeface="微软雅黑 Light" panose="020B0502040204020203" pitchFamily="34" charset="-122"/>
+              <a:ea typeface="微软雅黑 Light" panose="020B0502040204020203" pitchFamily="34" charset="-122"/>
+              <a:sym typeface="Helvetica Light"/>
+            </a:endParaRPr>
           </a:p>
           <a:p>
             <a:pPr>

</xml_diff>